<commit_message>
update lession 3 + 4
</commit_message>
<xml_diff>
--- a/giao-an/buoi2/BUỔI 2 COMPONENT & TƯ DUY CHIA NHỎ.pptx
+++ b/giao-an/buoi2/BUỔI 2 COMPONENT & TƯ DUY CHIA NHỎ.pptx
@@ -12,32 +12,37 @@
     <p:sldId id="265" r:id="rId6"/>
     <p:sldId id="274" r:id="rId7"/>
     <p:sldId id="270" r:id="rId8"/>
+    <p:sldId id="275" r:id="rId9"/>
+    <p:sldId id="276" r:id="rId10"/>
+    <p:sldId id="277" r:id="rId11"/>
+    <p:sldId id="278" r:id="rId12"/>
+    <p:sldId id="279" r:id="rId13"/>
   </p:sldIdLst>
   <p:sldSz cx="18288000" cy="10287000"/>
   <p:notesSz cx="6858000" cy="9144000"/>
   <p:embeddedFontLst>
     <p:embeddedFont>
-      <p:font typeface="Calibri" panose="020F0502020204030204" pitchFamily="34" charset="0"/>
-      <p:regular r:id="rId9"/>
-      <p:bold r:id="rId10"/>
-      <p:italic r:id="rId11"/>
-      <p:boldItalic r:id="rId12"/>
-    </p:embeddedFont>
-    <p:embeddedFont>
       <p:font typeface="Bricolage Grotesque Semi-Bold" panose="020B0604020202020204" charset="0"/>
-      <p:regular r:id="rId13"/>
+      <p:regular r:id="rId14"/>
     </p:embeddedFont>
     <p:embeddedFont>
       <p:font typeface="Canva Sans Bold" panose="020B0604020202020204" charset="0"/>
-      <p:regular r:id="rId14"/>
+      <p:regular r:id="rId15"/>
     </p:embeddedFont>
     <p:embeddedFont>
       <p:font typeface="Bricolage Grotesque Bold" panose="020B0604020202020204" charset="0"/>
-      <p:regular r:id="rId15"/>
+      <p:regular r:id="rId16"/>
     </p:embeddedFont>
     <p:embeddedFont>
       <p:font typeface="Bricolage Grotesque" panose="020B0604020202020204" charset="0"/>
-      <p:regular r:id="rId16"/>
+      <p:regular r:id="rId17"/>
+    </p:embeddedFont>
+    <p:embeddedFont>
+      <p:font typeface="Calibri" panose="020F0502020204030204" pitchFamily="34" charset="0"/>
+      <p:regular r:id="rId18"/>
+      <p:bold r:id="rId19"/>
+      <p:italic r:id="rId20"/>
+      <p:boldItalic r:id="rId21"/>
     </p:embeddedFont>
   </p:embeddedFontLst>
   <p:defaultTextStyle>
@@ -336,7 +341,7 @@
             <a:fld id="{1D8BD707-D9CF-40AE-B4C6-C98DA3205C09}" type="datetimeFigureOut">
               <a:rPr lang="en-US" smtClean="0"/>
               <a:pPr/>
-              <a:t>2026-01-02</a:t>
+              <a:t>2026-01-16</a:t>
             </a:fld>
             <a:endParaRPr lang="en-US"/>
           </a:p>
@@ -503,7 +508,7 @@
             <a:fld id="{1D8BD707-D9CF-40AE-B4C6-C98DA3205C09}" type="datetimeFigureOut">
               <a:rPr lang="en-US" smtClean="0"/>
               <a:pPr/>
-              <a:t>2026-01-02</a:t>
+              <a:t>2026-01-16</a:t>
             </a:fld>
             <a:endParaRPr lang="en-US"/>
           </a:p>
@@ -680,7 +685,7 @@
             <a:fld id="{1D8BD707-D9CF-40AE-B4C6-C98DA3205C09}" type="datetimeFigureOut">
               <a:rPr lang="en-US" smtClean="0"/>
               <a:pPr/>
-              <a:t>2026-01-02</a:t>
+              <a:t>2026-01-16</a:t>
             </a:fld>
             <a:endParaRPr lang="en-US"/>
           </a:p>
@@ -847,7 +852,7 @@
             <a:fld id="{1D8BD707-D9CF-40AE-B4C6-C98DA3205C09}" type="datetimeFigureOut">
               <a:rPr lang="en-US" smtClean="0"/>
               <a:pPr/>
-              <a:t>2026-01-02</a:t>
+              <a:t>2026-01-16</a:t>
             </a:fld>
             <a:endParaRPr lang="en-US"/>
           </a:p>
@@ -1090,7 +1095,7 @@
             <a:fld id="{1D8BD707-D9CF-40AE-B4C6-C98DA3205C09}" type="datetimeFigureOut">
               <a:rPr lang="en-US" smtClean="0"/>
               <a:pPr/>
-              <a:t>2026-01-02</a:t>
+              <a:t>2026-01-16</a:t>
             </a:fld>
             <a:endParaRPr lang="en-US"/>
           </a:p>
@@ -1375,7 +1380,7 @@
             <a:fld id="{1D8BD707-D9CF-40AE-B4C6-C98DA3205C09}" type="datetimeFigureOut">
               <a:rPr lang="en-US" smtClean="0"/>
               <a:pPr/>
-              <a:t>2026-01-02</a:t>
+              <a:t>2026-01-16</a:t>
             </a:fld>
             <a:endParaRPr lang="en-US"/>
           </a:p>
@@ -1794,7 +1799,7 @@
             <a:fld id="{1D8BD707-D9CF-40AE-B4C6-C98DA3205C09}" type="datetimeFigureOut">
               <a:rPr lang="en-US" smtClean="0"/>
               <a:pPr/>
-              <a:t>2026-01-02</a:t>
+              <a:t>2026-01-16</a:t>
             </a:fld>
             <a:endParaRPr lang="en-US"/>
           </a:p>
@@ -1909,7 +1914,7 @@
             <a:fld id="{1D8BD707-D9CF-40AE-B4C6-C98DA3205C09}" type="datetimeFigureOut">
               <a:rPr lang="en-US" smtClean="0"/>
               <a:pPr/>
-              <a:t>2026-01-02</a:t>
+              <a:t>2026-01-16</a:t>
             </a:fld>
             <a:endParaRPr lang="en-US"/>
           </a:p>
@@ -2001,7 +2006,7 @@
             <a:fld id="{1D8BD707-D9CF-40AE-B4C6-C98DA3205C09}" type="datetimeFigureOut">
               <a:rPr lang="en-US" smtClean="0"/>
               <a:pPr/>
-              <a:t>2026-01-02</a:t>
+              <a:t>2026-01-16</a:t>
             </a:fld>
             <a:endParaRPr lang="en-US"/>
           </a:p>
@@ -2275,7 +2280,7 @@
             <a:fld id="{1D8BD707-D9CF-40AE-B4C6-C98DA3205C09}" type="datetimeFigureOut">
               <a:rPr lang="en-US" smtClean="0"/>
               <a:pPr/>
-              <a:t>2026-01-02</a:t>
+              <a:t>2026-01-16</a:t>
             </a:fld>
             <a:endParaRPr lang="en-US"/>
           </a:p>
@@ -2525,7 +2530,7 @@
             <a:fld id="{1D8BD707-D9CF-40AE-B4C6-C98DA3205C09}" type="datetimeFigureOut">
               <a:rPr lang="en-US" smtClean="0"/>
               <a:pPr/>
-              <a:t>2026-01-02</a:t>
+              <a:t>2026-01-16</a:t>
             </a:fld>
             <a:endParaRPr lang="en-US"/>
           </a:p>
@@ -2735,7 +2740,7 @@
             <a:fld id="{1D8BD707-D9CF-40AE-B4C6-C98DA3205C09}" type="datetimeFigureOut">
               <a:rPr lang="en-US" smtClean="0"/>
               <a:pPr/>
-              <a:t>2026-01-02</a:t>
+              <a:t>2026-01-16</a:t>
             </a:fld>
             <a:endParaRPr lang="en-US"/>
           </a:p>
@@ -3170,7 +3175,7 @@
               <a:blip r:embed="rId2">
                 <a:extLst>
                   <a:ext uri="{96DAC541-7B7A-43D3-8B79-37D633B846F1}">
-                    <asvg:svgBlip xmlns="" xmlns:asvg="http://schemas.microsoft.com/office/drawing/2016/SVG/main" r:embed="rId4"/>
+                    <asvg:svgBlip xmlns:asvg="http://schemas.microsoft.com/office/drawing/2016/SVG/main" xmlns="" r:embed="rId4"/>
                   </a:ext>
                 </a:extLst>
               </a:blip>
@@ -3366,6 +3371,650 @@
 </p:sld>
 </file>
 
+<file path=ppt/slides/slide10.xml><?xml version="1.0" encoding="utf-8"?>
+<p:sld xmlns:a="http://schemas.openxmlformats.org/drawingml/2006/main" xmlns:r="http://schemas.openxmlformats.org/officeDocument/2006/relationships" xmlns:p="http://schemas.openxmlformats.org/presentationml/2006/main">
+  <p:cSld>
+    <p:spTree>
+      <p:nvGrpSpPr>
+        <p:cNvPr id="1" name=""/>
+        <p:cNvGrpSpPr/>
+        <p:nvPr/>
+      </p:nvGrpSpPr>
+      <p:grpSpPr>
+        <a:xfrm>
+          <a:off x="0" y="0"/>
+          <a:ext cx="0" cy="0"/>
+          <a:chOff x="0" y="0"/>
+          <a:chExt cx="0" cy="0"/>
+        </a:xfrm>
+      </p:grpSpPr>
+      <p:sp>
+        <p:nvSpPr>
+          <p:cNvPr id="3" name="TextBox 3"/>
+          <p:cNvSpPr txBox="1"/>
+          <p:nvPr/>
+        </p:nvSpPr>
+        <p:spPr>
+          <a:xfrm>
+            <a:off x="666750" y="800100"/>
+            <a:ext cx="16954500" cy="930275"/>
+          </a:xfrm>
+          <a:prstGeom prst="rect">
+            <a:avLst/>
+          </a:prstGeom>
+        </p:spPr>
+        <p:txBody>
+          <a:bodyPr lIns="0" tIns="0" rIns="0" bIns="0" rtlCol="0" anchor="t">
+            <a:spAutoFit/>
+          </a:bodyPr>
+          <a:lstStyle/>
+          <a:p>
+            <a:pPr lvl="0">
+              <a:lnSpc>
+                <a:spcPts val="6999"/>
+              </a:lnSpc>
+              <a:spcBef>
+                <a:spcPct val="0"/>
+              </a:spcBef>
+            </a:pPr>
+            <a:r>
+              <a:rPr lang="en-US" sz="6999" b="1" spc="-209" dirty="0" err="1" smtClean="0">
+                <a:solidFill>
+                  <a:srgbClr val="1E293B"/>
+                </a:solidFill>
+                <a:latin typeface="Bricolage Grotesque Semi-Bold"/>
+                <a:ea typeface="Bricolage Grotesque Semi-Bold"/>
+                <a:cs typeface="Bricolage Grotesque Semi-Bold"/>
+                <a:sym typeface="Bricolage Grotesque Semi-Bold"/>
+              </a:rPr>
+              <a:t>Bài</a:t>
+            </a:r>
+            <a:r>
+              <a:rPr lang="en-US" sz="6999" b="1" spc="-209" dirty="0" smtClean="0">
+                <a:solidFill>
+                  <a:srgbClr val="1E293B"/>
+                </a:solidFill>
+                <a:latin typeface="Bricolage Grotesque Semi-Bold"/>
+                <a:ea typeface="Bricolage Grotesque Semi-Bold"/>
+                <a:cs typeface="Bricolage Grotesque Semi-Bold"/>
+                <a:sym typeface="Bricolage Grotesque Semi-Bold"/>
+              </a:rPr>
+              <a:t> </a:t>
+            </a:r>
+            <a:r>
+              <a:rPr lang="en-US" sz="6999" b="1" spc="-209" dirty="0" err="1" smtClean="0">
+                <a:solidFill>
+                  <a:srgbClr val="1E293B"/>
+                </a:solidFill>
+                <a:latin typeface="Bricolage Grotesque Semi-Bold"/>
+                <a:ea typeface="Bricolage Grotesque Semi-Bold"/>
+                <a:cs typeface="Bricolage Grotesque Semi-Bold"/>
+                <a:sym typeface="Bricolage Grotesque Semi-Bold"/>
+              </a:rPr>
+              <a:t>Lịch</a:t>
+            </a:r>
+            <a:r>
+              <a:rPr lang="en-US" sz="6999" b="1" spc="-209" dirty="0" smtClean="0">
+                <a:solidFill>
+                  <a:srgbClr val="1E293B"/>
+                </a:solidFill>
+                <a:latin typeface="Bricolage Grotesque Semi-Bold"/>
+                <a:ea typeface="Bricolage Grotesque Semi-Bold"/>
+                <a:cs typeface="Bricolage Grotesque Semi-Bold"/>
+                <a:sym typeface="Bricolage Grotesque Semi-Bold"/>
+              </a:rPr>
+              <a:t> </a:t>
+            </a:r>
+            <a:r>
+              <a:rPr lang="en-US" sz="6999" b="1" spc="-209" dirty="0" err="1" smtClean="0">
+                <a:solidFill>
+                  <a:srgbClr val="1E293B"/>
+                </a:solidFill>
+                <a:latin typeface="Bricolage Grotesque Semi-Bold"/>
+                <a:ea typeface="Bricolage Grotesque Semi-Bold"/>
+                <a:cs typeface="Bricolage Grotesque Semi-Bold"/>
+                <a:sym typeface="Bricolage Grotesque Semi-Bold"/>
+              </a:rPr>
+              <a:t>đá</a:t>
+            </a:r>
+            <a:r>
+              <a:rPr lang="en-US" sz="6999" b="1" spc="-209" dirty="0" smtClean="0">
+                <a:solidFill>
+                  <a:srgbClr val="1E293B"/>
+                </a:solidFill>
+                <a:latin typeface="Bricolage Grotesque Semi-Bold"/>
+                <a:ea typeface="Bricolage Grotesque Semi-Bold"/>
+                <a:cs typeface="Bricolage Grotesque Semi-Bold"/>
+                <a:sym typeface="Bricolage Grotesque Semi-Bold"/>
+              </a:rPr>
+              <a:t> </a:t>
+            </a:r>
+            <a:r>
+              <a:rPr lang="en-US" sz="6999" b="1" spc="-209" dirty="0" err="1" smtClean="0">
+                <a:solidFill>
+                  <a:srgbClr val="1E293B"/>
+                </a:solidFill>
+                <a:latin typeface="Bricolage Grotesque Semi-Bold"/>
+                <a:ea typeface="Bricolage Grotesque Semi-Bold"/>
+                <a:cs typeface="Bricolage Grotesque Semi-Bold"/>
+                <a:sym typeface="Bricolage Grotesque Semi-Bold"/>
+              </a:rPr>
+              <a:t>bóng</a:t>
+            </a:r>
+            <a:endParaRPr lang="en-US" sz="6999" b="1" u="none" strike="noStrike" spc="-209" dirty="0">
+              <a:solidFill>
+                <a:srgbClr val="1E293B"/>
+              </a:solidFill>
+              <a:latin typeface="Bricolage Grotesque Semi-Bold"/>
+              <a:ea typeface="Bricolage Grotesque Semi-Bold"/>
+              <a:cs typeface="Bricolage Grotesque Semi-Bold"/>
+              <a:sym typeface="Bricolage Grotesque Semi-Bold"/>
+            </a:endParaRPr>
+          </a:p>
+        </p:txBody>
+      </p:sp>
+      <p:pic>
+        <p:nvPicPr>
+          <p:cNvPr id="2" name="Picture 1"/>
+          <p:cNvPicPr>
+            <a:picLocks noChangeAspect="1"/>
+          </p:cNvPicPr>
+          <p:nvPr/>
+        </p:nvPicPr>
+        <p:blipFill>
+          <a:blip r:embed="rId2"/>
+          <a:stretch>
+            <a:fillRect/>
+          </a:stretch>
+        </p:blipFill>
+        <p:spPr>
+          <a:xfrm>
+            <a:off x="8077200" y="495300"/>
+            <a:ext cx="9743852" cy="8763000"/>
+          </a:xfrm>
+          <a:prstGeom prst="rect">
+            <a:avLst/>
+          </a:prstGeom>
+        </p:spPr>
+      </p:pic>
+      <p:pic>
+        <p:nvPicPr>
+          <p:cNvPr id="5" name="Picture 4"/>
+          <p:cNvPicPr>
+            <a:picLocks noChangeAspect="1"/>
+          </p:cNvPicPr>
+          <p:nvPr/>
+        </p:nvPicPr>
+        <p:blipFill>
+          <a:blip r:embed="rId3"/>
+          <a:stretch>
+            <a:fillRect/>
+          </a:stretch>
+        </p:blipFill>
+        <p:spPr>
+          <a:xfrm>
+            <a:off x="631916" y="5405846"/>
+            <a:ext cx="7117735" cy="3886200"/>
+          </a:xfrm>
+          <a:prstGeom prst="rect">
+            <a:avLst/>
+          </a:prstGeom>
+        </p:spPr>
+      </p:pic>
+    </p:spTree>
+    <p:extLst>
+      <p:ext uri="{BB962C8B-B14F-4D97-AF65-F5344CB8AC3E}">
+        <p14:creationId xmlns:p14="http://schemas.microsoft.com/office/powerpoint/2010/main" val="2306779901"/>
+      </p:ext>
+    </p:extLst>
+  </p:cSld>
+  <p:clrMapOvr>
+    <a:masterClrMapping/>
+  </p:clrMapOvr>
+  <p:timing>
+    <p:tnLst>
+      <p:par>
+        <p:cTn id="1" dur="indefinite" restart="never" nodeType="tmRoot"/>
+      </p:par>
+    </p:tnLst>
+  </p:timing>
+</p:sld>
+</file>
+
+<file path=ppt/slides/slide11.xml><?xml version="1.0" encoding="utf-8"?>
+<p:sld xmlns:a="http://schemas.openxmlformats.org/drawingml/2006/main" xmlns:r="http://schemas.openxmlformats.org/officeDocument/2006/relationships" xmlns:p="http://schemas.openxmlformats.org/presentationml/2006/main">
+  <p:cSld>
+    <p:spTree>
+      <p:nvGrpSpPr>
+        <p:cNvPr id="1" name=""/>
+        <p:cNvGrpSpPr/>
+        <p:nvPr/>
+      </p:nvGrpSpPr>
+      <p:grpSpPr>
+        <a:xfrm>
+          <a:off x="0" y="0"/>
+          <a:ext cx="0" cy="0"/>
+          <a:chOff x="0" y="0"/>
+          <a:chExt cx="0" cy="0"/>
+        </a:xfrm>
+      </p:grpSpPr>
+      <p:sp>
+        <p:nvSpPr>
+          <p:cNvPr id="3" name="TextBox 3"/>
+          <p:cNvSpPr txBox="1"/>
+          <p:nvPr/>
+        </p:nvSpPr>
+        <p:spPr>
+          <a:xfrm>
+            <a:off x="666750" y="800100"/>
+            <a:ext cx="6724650" cy="1795363"/>
+          </a:xfrm>
+          <a:prstGeom prst="rect">
+            <a:avLst/>
+          </a:prstGeom>
+        </p:spPr>
+        <p:txBody>
+          <a:bodyPr wrap="square" lIns="0" tIns="0" rIns="0" bIns="0" rtlCol="0" anchor="t">
+            <a:spAutoFit/>
+          </a:bodyPr>
+          <a:lstStyle/>
+          <a:p>
+            <a:pPr lvl="0">
+              <a:lnSpc>
+                <a:spcPts val="6999"/>
+              </a:lnSpc>
+              <a:spcBef>
+                <a:spcPct val="0"/>
+              </a:spcBef>
+            </a:pPr>
+            <a:r>
+              <a:rPr lang="en-US" sz="6999" b="1" spc="-209" dirty="0" err="1" smtClean="0">
+                <a:solidFill>
+                  <a:srgbClr val="1E293B"/>
+                </a:solidFill>
+                <a:latin typeface="Bricolage Grotesque Semi-Bold"/>
+                <a:ea typeface="Bricolage Grotesque Semi-Bold"/>
+                <a:cs typeface="Bricolage Grotesque Semi-Bold"/>
+                <a:sym typeface="Bricolage Grotesque Semi-Bold"/>
+              </a:rPr>
+              <a:t>Bài</a:t>
+            </a:r>
+            <a:r>
+              <a:rPr lang="en-US" sz="6999" b="1" spc="-209" dirty="0" smtClean="0">
+                <a:solidFill>
+                  <a:srgbClr val="1E293B"/>
+                </a:solidFill>
+                <a:latin typeface="Bricolage Grotesque Semi-Bold"/>
+                <a:ea typeface="Bricolage Grotesque Semi-Bold"/>
+                <a:cs typeface="Bricolage Grotesque Semi-Bold"/>
+                <a:sym typeface="Bricolage Grotesque Semi-Bold"/>
+              </a:rPr>
+              <a:t> Layout Dashboard</a:t>
+            </a:r>
+            <a:endParaRPr lang="en-US" sz="6999" b="1" u="none" strike="noStrike" spc="-209" dirty="0">
+              <a:solidFill>
+                <a:srgbClr val="1E293B"/>
+              </a:solidFill>
+              <a:latin typeface="Bricolage Grotesque Semi-Bold"/>
+              <a:ea typeface="Bricolage Grotesque Semi-Bold"/>
+              <a:cs typeface="Bricolage Grotesque Semi-Bold"/>
+              <a:sym typeface="Bricolage Grotesque Semi-Bold"/>
+            </a:endParaRPr>
+          </a:p>
+        </p:txBody>
+      </p:sp>
+      <p:pic>
+        <p:nvPicPr>
+          <p:cNvPr id="5" name="Picture 4"/>
+          <p:cNvPicPr>
+            <a:picLocks noChangeAspect="1"/>
+          </p:cNvPicPr>
+          <p:nvPr/>
+        </p:nvPicPr>
+        <p:blipFill>
+          <a:blip r:embed="rId2"/>
+          <a:stretch>
+            <a:fillRect/>
+          </a:stretch>
+        </p:blipFill>
+        <p:spPr>
+          <a:xfrm>
+            <a:off x="660219" y="6286500"/>
+            <a:ext cx="5334000" cy="3359336"/>
+          </a:xfrm>
+          <a:prstGeom prst="rect">
+            <a:avLst/>
+          </a:prstGeom>
+        </p:spPr>
+      </p:pic>
+      <p:sp>
+        <p:nvSpPr>
+          <p:cNvPr id="6" name="TextBox 4"/>
+          <p:cNvSpPr txBox="1"/>
+          <p:nvPr/>
+        </p:nvSpPr>
+        <p:spPr>
+          <a:xfrm>
+            <a:off x="686344" y="5372100"/>
+            <a:ext cx="12273022" cy="534377"/>
+          </a:xfrm>
+          <a:prstGeom prst="rect">
+            <a:avLst/>
+          </a:prstGeom>
+        </p:spPr>
+        <p:txBody>
+          <a:bodyPr wrap="square" lIns="0" tIns="0" rIns="0" bIns="0" rtlCol="0" anchor="t">
+            <a:spAutoFit/>
+          </a:bodyPr>
+          <a:lstStyle/>
+          <a:p>
+            <a:pPr marL="323850" lvl="1">
+              <a:lnSpc>
+                <a:spcPts val="4500"/>
+              </a:lnSpc>
+            </a:pPr>
+            <a:r>
+              <a:rPr lang="en-US" sz="3000" dirty="0" smtClean="0">
+                <a:solidFill>
+                  <a:srgbClr val="1E293B"/>
+                </a:solidFill>
+                <a:latin typeface="Calibri" panose="020F0502020204030204" pitchFamily="34" charset="0"/>
+                <a:ea typeface="Calibri" panose="020F0502020204030204" pitchFamily="34" charset="0"/>
+                <a:cs typeface="Calibri" panose="020F0502020204030204" pitchFamily="34" charset="0"/>
+                <a:sym typeface="Bricolage Grotesque Bold"/>
+              </a:rPr>
+              <a:t>Code </a:t>
+            </a:r>
+            <a:r>
+              <a:rPr lang="en-US" sz="3000" dirty="0" err="1" smtClean="0">
+                <a:solidFill>
+                  <a:srgbClr val="1E293B"/>
+                </a:solidFill>
+                <a:latin typeface="Calibri" panose="020F0502020204030204" pitchFamily="34" charset="0"/>
+                <a:ea typeface="Calibri" panose="020F0502020204030204" pitchFamily="34" charset="0"/>
+                <a:cs typeface="Calibri" panose="020F0502020204030204" pitchFamily="34" charset="0"/>
+                <a:sym typeface="Bricolage Grotesque Bold"/>
+              </a:rPr>
+              <a:t>mẫu</a:t>
+            </a:r>
+            <a:r>
+              <a:rPr lang="en-US" sz="3000" dirty="0" smtClean="0">
+                <a:solidFill>
+                  <a:srgbClr val="1E293B"/>
+                </a:solidFill>
+                <a:latin typeface="Calibri" panose="020F0502020204030204" pitchFamily="34" charset="0"/>
+                <a:ea typeface="Calibri" panose="020F0502020204030204" pitchFamily="34" charset="0"/>
+                <a:cs typeface="Calibri" panose="020F0502020204030204" pitchFamily="34" charset="0"/>
+                <a:sym typeface="Bricolage Grotesque Bold"/>
+              </a:rPr>
+              <a:t> </a:t>
+            </a:r>
+            <a:r>
+              <a:rPr lang="en-US" sz="3000" dirty="0" err="1" smtClean="0">
+                <a:solidFill>
+                  <a:srgbClr val="1E293B"/>
+                </a:solidFill>
+                <a:latin typeface="Calibri" panose="020F0502020204030204" pitchFamily="34" charset="0"/>
+                <a:ea typeface="Calibri" panose="020F0502020204030204" pitchFamily="34" charset="0"/>
+                <a:cs typeface="Calibri" panose="020F0502020204030204" pitchFamily="34" charset="0"/>
+                <a:sym typeface="Bricolage Grotesque Bold"/>
+              </a:rPr>
+              <a:t>tham</a:t>
+            </a:r>
+            <a:r>
+              <a:rPr lang="en-US" sz="3000" dirty="0" smtClean="0">
+                <a:solidFill>
+                  <a:srgbClr val="1E293B"/>
+                </a:solidFill>
+                <a:latin typeface="Calibri" panose="020F0502020204030204" pitchFamily="34" charset="0"/>
+                <a:ea typeface="Calibri" panose="020F0502020204030204" pitchFamily="34" charset="0"/>
+                <a:cs typeface="Calibri" panose="020F0502020204030204" pitchFamily="34" charset="0"/>
+                <a:sym typeface="Bricolage Grotesque Bold"/>
+              </a:rPr>
+              <a:t> </a:t>
+            </a:r>
+            <a:r>
+              <a:rPr lang="en-US" sz="3000" dirty="0" err="1" smtClean="0">
+                <a:solidFill>
+                  <a:srgbClr val="1E293B"/>
+                </a:solidFill>
+                <a:latin typeface="Calibri" panose="020F0502020204030204" pitchFamily="34" charset="0"/>
+                <a:ea typeface="Calibri" panose="020F0502020204030204" pitchFamily="34" charset="0"/>
+                <a:cs typeface="Calibri" panose="020F0502020204030204" pitchFamily="34" charset="0"/>
+                <a:sym typeface="Bricolage Grotesque Bold"/>
+              </a:rPr>
+              <a:t>khảo</a:t>
+            </a:r>
+            <a:endParaRPr lang="en-US" sz="3000" dirty="0">
+              <a:solidFill>
+                <a:srgbClr val="1E293B"/>
+              </a:solidFill>
+              <a:latin typeface="Calibri" panose="020F0502020204030204" pitchFamily="34" charset="0"/>
+              <a:ea typeface="Calibri" panose="020F0502020204030204" pitchFamily="34" charset="0"/>
+              <a:cs typeface="Calibri" panose="020F0502020204030204" pitchFamily="34" charset="0"/>
+              <a:sym typeface="Bricolage Grotesque Bold"/>
+            </a:endParaRPr>
+          </a:p>
+        </p:txBody>
+      </p:sp>
+      <p:pic>
+        <p:nvPicPr>
+          <p:cNvPr id="7" name="Picture 6"/>
+          <p:cNvPicPr>
+            <a:picLocks noChangeAspect="1"/>
+          </p:cNvPicPr>
+          <p:nvPr/>
+        </p:nvPicPr>
+        <p:blipFill>
+          <a:blip r:embed="rId3"/>
+          <a:stretch>
+            <a:fillRect/>
+          </a:stretch>
+        </p:blipFill>
+        <p:spPr>
+          <a:xfrm>
+            <a:off x="7010400" y="571500"/>
+            <a:ext cx="10840963" cy="8792802"/>
+          </a:xfrm>
+          <a:prstGeom prst="rect">
+            <a:avLst/>
+          </a:prstGeom>
+        </p:spPr>
+      </p:pic>
+    </p:spTree>
+    <p:extLst>
+      <p:ext uri="{BB962C8B-B14F-4D97-AF65-F5344CB8AC3E}">
+        <p14:creationId xmlns:p14="http://schemas.microsoft.com/office/powerpoint/2010/main" val="3221067482"/>
+      </p:ext>
+    </p:extLst>
+  </p:cSld>
+  <p:clrMapOvr>
+    <a:masterClrMapping/>
+  </p:clrMapOvr>
+  <p:timing>
+    <p:tnLst>
+      <p:par>
+        <p:cTn id="1" dur="indefinite" restart="never" nodeType="tmRoot"/>
+      </p:par>
+    </p:tnLst>
+  </p:timing>
+</p:sld>
+</file>
+
+<file path=ppt/slides/slide12.xml><?xml version="1.0" encoding="utf-8"?>
+<p:sld xmlns:a="http://schemas.openxmlformats.org/drawingml/2006/main" xmlns:r="http://schemas.openxmlformats.org/officeDocument/2006/relationships" xmlns:p="http://schemas.openxmlformats.org/presentationml/2006/main">
+  <p:cSld>
+    <p:spTree>
+      <p:nvGrpSpPr>
+        <p:cNvPr id="1" name=""/>
+        <p:cNvGrpSpPr/>
+        <p:nvPr/>
+      </p:nvGrpSpPr>
+      <p:grpSpPr>
+        <a:xfrm>
+          <a:off x="0" y="0"/>
+          <a:ext cx="0" cy="0"/>
+          <a:chOff x="0" y="0"/>
+          <a:chExt cx="0" cy="0"/>
+        </a:xfrm>
+      </p:grpSpPr>
+      <p:sp>
+        <p:nvSpPr>
+          <p:cNvPr id="3" name="TextBox 3"/>
+          <p:cNvSpPr txBox="1"/>
+          <p:nvPr/>
+        </p:nvSpPr>
+        <p:spPr>
+          <a:xfrm>
+            <a:off x="666750" y="800100"/>
+            <a:ext cx="6724650" cy="915572"/>
+          </a:xfrm>
+          <a:prstGeom prst="rect">
+            <a:avLst/>
+          </a:prstGeom>
+        </p:spPr>
+        <p:txBody>
+          <a:bodyPr wrap="square" lIns="0" tIns="0" rIns="0" bIns="0" rtlCol="0" anchor="t">
+            <a:spAutoFit/>
+          </a:bodyPr>
+          <a:lstStyle/>
+          <a:p>
+            <a:pPr lvl="0">
+              <a:lnSpc>
+                <a:spcPts val="6999"/>
+              </a:lnSpc>
+              <a:spcBef>
+                <a:spcPct val="0"/>
+              </a:spcBef>
+            </a:pPr>
+            <a:r>
+              <a:rPr lang="en-US" sz="6999" b="1" spc="-209" dirty="0" err="1" smtClean="0">
+                <a:solidFill>
+                  <a:srgbClr val="1E293B"/>
+                </a:solidFill>
+                <a:latin typeface="Bricolage Grotesque Semi-Bold"/>
+                <a:ea typeface="Bricolage Grotesque Semi-Bold"/>
+                <a:cs typeface="Bricolage Grotesque Semi-Bold"/>
+                <a:sym typeface="Bricolage Grotesque Semi-Bold"/>
+              </a:rPr>
+              <a:t>Bài</a:t>
+            </a:r>
+            <a:r>
+              <a:rPr lang="en-US" sz="6999" b="1" spc="-209" dirty="0" smtClean="0">
+                <a:solidFill>
+                  <a:srgbClr val="1E293B"/>
+                </a:solidFill>
+                <a:latin typeface="Bricolage Grotesque Semi-Bold"/>
+                <a:ea typeface="Bricolage Grotesque Semi-Bold"/>
+                <a:cs typeface="Bricolage Grotesque Semi-Bold"/>
+                <a:sym typeface="Bricolage Grotesque Semi-Bold"/>
+              </a:rPr>
+              <a:t> UI Kit</a:t>
+            </a:r>
+            <a:endParaRPr lang="en-US" sz="6999" b="1" u="none" strike="noStrike" spc="-209" dirty="0">
+              <a:solidFill>
+                <a:srgbClr val="1E293B"/>
+              </a:solidFill>
+              <a:latin typeface="Bricolage Grotesque Semi-Bold"/>
+              <a:ea typeface="Bricolage Grotesque Semi-Bold"/>
+              <a:cs typeface="Bricolage Grotesque Semi-Bold"/>
+              <a:sym typeface="Bricolage Grotesque Semi-Bold"/>
+            </a:endParaRPr>
+          </a:p>
+        </p:txBody>
+      </p:sp>
+      <p:pic>
+        <p:nvPicPr>
+          <p:cNvPr id="2" name="Picture 1"/>
+          <p:cNvPicPr>
+            <a:picLocks noChangeAspect="1"/>
+          </p:cNvPicPr>
+          <p:nvPr/>
+        </p:nvPicPr>
+        <p:blipFill>
+          <a:blip r:embed="rId2"/>
+          <a:stretch>
+            <a:fillRect/>
+          </a:stretch>
+        </p:blipFill>
+        <p:spPr>
+          <a:xfrm>
+            <a:off x="9906000" y="1028700"/>
+            <a:ext cx="6705600" cy="5762903"/>
+          </a:xfrm>
+          <a:prstGeom prst="rect">
+            <a:avLst/>
+          </a:prstGeom>
+        </p:spPr>
+      </p:pic>
+      <p:pic>
+        <p:nvPicPr>
+          <p:cNvPr id="4" name="Picture 3"/>
+          <p:cNvPicPr>
+            <a:picLocks noChangeAspect="1"/>
+          </p:cNvPicPr>
+          <p:nvPr/>
+        </p:nvPicPr>
+        <p:blipFill>
+          <a:blip r:embed="rId3"/>
+          <a:stretch>
+            <a:fillRect/>
+          </a:stretch>
+        </p:blipFill>
+        <p:spPr>
+          <a:xfrm>
+            <a:off x="666750" y="3086100"/>
+            <a:ext cx="5930504" cy="2590800"/>
+          </a:xfrm>
+          <a:prstGeom prst="rect">
+            <a:avLst/>
+          </a:prstGeom>
+        </p:spPr>
+      </p:pic>
+      <p:pic>
+        <p:nvPicPr>
+          <p:cNvPr id="8" name="Picture 7"/>
+          <p:cNvPicPr>
+            <a:picLocks noChangeAspect="1"/>
+          </p:cNvPicPr>
+          <p:nvPr/>
+        </p:nvPicPr>
+        <p:blipFill>
+          <a:blip r:embed="rId4"/>
+          <a:stretch>
+            <a:fillRect/>
+          </a:stretch>
+        </p:blipFill>
+        <p:spPr>
+          <a:xfrm>
+            <a:off x="666750" y="6362700"/>
+            <a:ext cx="7924800" cy="3280968"/>
+          </a:xfrm>
+          <a:prstGeom prst="rect">
+            <a:avLst/>
+          </a:prstGeom>
+        </p:spPr>
+      </p:pic>
+    </p:spTree>
+    <p:extLst>
+      <p:ext uri="{BB962C8B-B14F-4D97-AF65-F5344CB8AC3E}">
+        <p14:creationId xmlns:p14="http://schemas.microsoft.com/office/powerpoint/2010/main" val="148239463"/>
+      </p:ext>
+    </p:extLst>
+  </p:cSld>
+  <p:clrMapOvr>
+    <a:masterClrMapping/>
+  </p:clrMapOvr>
+  <p:timing>
+    <p:tnLst>
+      <p:par>
+        <p:cTn id="1" dur="indefinite" restart="never" nodeType="tmRoot"/>
+      </p:par>
+    </p:tnLst>
+  </p:timing>
+</p:sld>
+</file>
+
 <file path=ppt/slides/slide2.xml><?xml version="1.0" encoding="utf-8"?>
 <p:sld xmlns:a="http://schemas.openxmlformats.org/drawingml/2006/main" xmlns:r="http://schemas.openxmlformats.org/officeDocument/2006/relationships" xmlns:p="http://schemas.openxmlformats.org/presentationml/2006/main">
   <p:cSld>
@@ -4778,8 +5427,8 @@
         </p:nvSpPr>
         <p:spPr>
           <a:xfrm>
-            <a:off x="5435524" y="1181100"/>
-            <a:ext cx="10058400" cy="461665"/>
+            <a:off x="12753947" y="3009900"/>
+            <a:ext cx="6172200" cy="2631490"/>
           </a:xfrm>
           <a:prstGeom prst="rect">
             <a:avLst/>
@@ -4793,7 +5442,7 @@
           <a:p>
             <a:pPr marL="0" lvl="0" indent="0" algn="l">
               <a:lnSpc>
-                <a:spcPts val="3600"/>
+                <a:spcPct val="150000"/>
               </a:lnSpc>
               <a:spcBef>
                 <a:spcPct val="0"/>
@@ -4999,7 +5648,7 @@
               <a:blip r:embed="rId2">
                 <a:extLst>
                   <a:ext uri="{96DAC541-7B7A-43D3-8B79-37D633B846F1}">
-                    <asvg:svgBlip xmlns="" xmlns:asvg="http://schemas.microsoft.com/office/drawing/2016/SVG/main" r:embed="rId4"/>
+                    <asvg:svgBlip xmlns:asvg="http://schemas.microsoft.com/office/drawing/2016/SVG/main" xmlns="" r:embed="rId4"/>
                   </a:ext>
                 </a:extLst>
               </a:blip>
@@ -5117,7 +5766,7 @@
       </p:grpSp>
       <p:pic>
         <p:nvPicPr>
-          <p:cNvPr id="2" name="Picture 1"/>
+          <p:cNvPr id="3" name="Picture 2"/>
           <p:cNvPicPr>
             <a:picLocks noChangeAspect="1"/>
           </p:cNvPicPr>
@@ -5131,8 +5780,8 @@
         </p:blipFill>
         <p:spPr>
           <a:xfrm>
-            <a:off x="533400" y="1943100"/>
-            <a:ext cx="15428870" cy="7543800"/>
+            <a:off x="304800" y="190500"/>
+            <a:ext cx="11353800" cy="9866343"/>
           </a:xfrm>
           <a:prstGeom prst="rect">
             <a:avLst/>
@@ -5140,6 +5789,306 @@
         </p:spPr>
       </p:pic>
     </p:spTree>
+  </p:cSld>
+  <p:clrMapOvr>
+    <a:masterClrMapping/>
+  </p:clrMapOvr>
+  <p:timing>
+    <p:tnLst>
+      <p:par>
+        <p:cTn id="1" dur="indefinite" restart="never" nodeType="tmRoot"/>
+      </p:par>
+    </p:tnLst>
+  </p:timing>
+</p:sld>
+</file>
+
+<file path=ppt/slides/slide8.xml><?xml version="1.0" encoding="utf-8"?>
+<p:sld xmlns:a="http://schemas.openxmlformats.org/drawingml/2006/main" xmlns:r="http://schemas.openxmlformats.org/officeDocument/2006/relationships" xmlns:p="http://schemas.openxmlformats.org/presentationml/2006/main">
+  <p:cSld>
+    <p:spTree>
+      <p:nvGrpSpPr>
+        <p:cNvPr id="1" name=""/>
+        <p:cNvGrpSpPr/>
+        <p:nvPr/>
+      </p:nvGrpSpPr>
+      <p:grpSpPr>
+        <a:xfrm>
+          <a:off x="0" y="0"/>
+          <a:ext cx="0" cy="0"/>
+          <a:chOff x="0" y="0"/>
+          <a:chExt cx="0" cy="0"/>
+        </a:xfrm>
+      </p:grpSpPr>
+      <p:sp>
+        <p:nvSpPr>
+          <p:cNvPr id="3" name="TextBox 3"/>
+          <p:cNvSpPr txBox="1"/>
+          <p:nvPr/>
+        </p:nvSpPr>
+        <p:spPr>
+          <a:xfrm>
+            <a:off x="666750" y="800100"/>
+            <a:ext cx="16954500" cy="930275"/>
+          </a:xfrm>
+          <a:prstGeom prst="rect">
+            <a:avLst/>
+          </a:prstGeom>
+        </p:spPr>
+        <p:txBody>
+          <a:bodyPr lIns="0" tIns="0" rIns="0" bIns="0" rtlCol="0" anchor="t">
+            <a:spAutoFit/>
+          </a:bodyPr>
+          <a:lstStyle/>
+          <a:p>
+            <a:pPr lvl="0">
+              <a:lnSpc>
+                <a:spcPts val="6999"/>
+              </a:lnSpc>
+              <a:spcBef>
+                <a:spcPct val="0"/>
+              </a:spcBef>
+            </a:pPr>
+            <a:r>
+              <a:rPr lang="en-US" sz="6999" b="1" spc="-209" dirty="0" err="1" smtClean="0">
+                <a:solidFill>
+                  <a:srgbClr val="1E293B"/>
+                </a:solidFill>
+                <a:latin typeface="Bricolage Grotesque Semi-Bold"/>
+                <a:ea typeface="Bricolage Grotesque Semi-Bold"/>
+                <a:cs typeface="Bricolage Grotesque Semi-Bold"/>
+                <a:sym typeface="Bricolage Grotesque Semi-Bold"/>
+              </a:rPr>
+              <a:t>Bài</a:t>
+            </a:r>
+            <a:r>
+              <a:rPr lang="en-US" sz="6999" b="1" spc="-209" dirty="0" smtClean="0">
+                <a:solidFill>
+                  <a:srgbClr val="1E293B"/>
+                </a:solidFill>
+                <a:latin typeface="Bricolage Grotesque Semi-Bold"/>
+                <a:ea typeface="Bricolage Grotesque Semi-Bold"/>
+                <a:cs typeface="Bricolage Grotesque Semi-Bold"/>
+                <a:sym typeface="Bricolage Grotesque Semi-Bold"/>
+              </a:rPr>
+              <a:t> 1 Profile Card</a:t>
+            </a:r>
+            <a:endParaRPr lang="en-US" sz="6999" b="1" u="none" strike="noStrike" spc="-209" dirty="0">
+              <a:solidFill>
+                <a:srgbClr val="1E293B"/>
+              </a:solidFill>
+              <a:latin typeface="Bricolage Grotesque Semi-Bold"/>
+              <a:ea typeface="Bricolage Grotesque Semi-Bold"/>
+              <a:cs typeface="Bricolage Grotesque Semi-Bold"/>
+              <a:sym typeface="Bricolage Grotesque Semi-Bold"/>
+            </a:endParaRPr>
+          </a:p>
+        </p:txBody>
+      </p:sp>
+      <p:pic>
+        <p:nvPicPr>
+          <p:cNvPr id="2" name="Picture 1"/>
+          <p:cNvPicPr>
+            <a:picLocks noChangeAspect="1"/>
+          </p:cNvPicPr>
+          <p:nvPr/>
+        </p:nvPicPr>
+        <p:blipFill>
+          <a:blip r:embed="rId2"/>
+          <a:stretch>
+            <a:fillRect/>
+          </a:stretch>
+        </p:blipFill>
+        <p:spPr>
+          <a:xfrm>
+            <a:off x="5105400" y="1943100"/>
+            <a:ext cx="12727176" cy="6858957"/>
+          </a:xfrm>
+          <a:prstGeom prst="rect">
+            <a:avLst/>
+          </a:prstGeom>
+        </p:spPr>
+      </p:pic>
+      <p:pic>
+        <p:nvPicPr>
+          <p:cNvPr id="4" name="Picture 3"/>
+          <p:cNvPicPr>
+            <a:picLocks noChangeAspect="1"/>
+          </p:cNvPicPr>
+          <p:nvPr/>
+        </p:nvPicPr>
+        <p:blipFill>
+          <a:blip r:embed="rId3"/>
+          <a:stretch>
+            <a:fillRect/>
+          </a:stretch>
+        </p:blipFill>
+        <p:spPr>
+          <a:xfrm>
+            <a:off x="533400" y="6515100"/>
+            <a:ext cx="5213325" cy="3263406"/>
+          </a:xfrm>
+          <a:prstGeom prst="rect">
+            <a:avLst/>
+          </a:prstGeom>
+        </p:spPr>
+      </p:pic>
+    </p:spTree>
+    <p:extLst>
+      <p:ext uri="{BB962C8B-B14F-4D97-AF65-F5344CB8AC3E}">
+        <p14:creationId xmlns:p14="http://schemas.microsoft.com/office/powerpoint/2010/main" val="272205904"/>
+      </p:ext>
+    </p:extLst>
+  </p:cSld>
+  <p:clrMapOvr>
+    <a:masterClrMapping/>
+  </p:clrMapOvr>
+  <p:timing>
+    <p:tnLst>
+      <p:par>
+        <p:cTn id="1" dur="indefinite" restart="never" nodeType="tmRoot"/>
+      </p:par>
+    </p:tnLst>
+  </p:timing>
+</p:sld>
+</file>
+
+<file path=ppt/slides/slide9.xml><?xml version="1.0" encoding="utf-8"?>
+<p:sld xmlns:a="http://schemas.openxmlformats.org/drawingml/2006/main" xmlns:r="http://schemas.openxmlformats.org/officeDocument/2006/relationships" xmlns:p="http://schemas.openxmlformats.org/presentationml/2006/main">
+  <p:cSld>
+    <p:spTree>
+      <p:nvGrpSpPr>
+        <p:cNvPr id="1" name=""/>
+        <p:cNvGrpSpPr/>
+        <p:nvPr/>
+      </p:nvGrpSpPr>
+      <p:grpSpPr>
+        <a:xfrm>
+          <a:off x="0" y="0"/>
+          <a:ext cx="0" cy="0"/>
+          <a:chOff x="0" y="0"/>
+          <a:chExt cx="0" cy="0"/>
+        </a:xfrm>
+      </p:grpSpPr>
+      <p:sp>
+        <p:nvSpPr>
+          <p:cNvPr id="3" name="TextBox 3"/>
+          <p:cNvSpPr txBox="1"/>
+          <p:nvPr/>
+        </p:nvSpPr>
+        <p:spPr>
+          <a:xfrm>
+            <a:off x="666750" y="800100"/>
+            <a:ext cx="16954500" cy="930275"/>
+          </a:xfrm>
+          <a:prstGeom prst="rect">
+            <a:avLst/>
+          </a:prstGeom>
+        </p:spPr>
+        <p:txBody>
+          <a:bodyPr lIns="0" tIns="0" rIns="0" bIns="0" rtlCol="0" anchor="t">
+            <a:spAutoFit/>
+          </a:bodyPr>
+          <a:lstStyle/>
+          <a:p>
+            <a:pPr lvl="0">
+              <a:lnSpc>
+                <a:spcPts val="6999"/>
+              </a:lnSpc>
+              <a:spcBef>
+                <a:spcPct val="0"/>
+              </a:spcBef>
+            </a:pPr>
+            <a:r>
+              <a:rPr lang="en-US" sz="6999" b="1" spc="-209" dirty="0" err="1" smtClean="0">
+                <a:solidFill>
+                  <a:srgbClr val="1E293B"/>
+                </a:solidFill>
+                <a:latin typeface="Bricolage Grotesque Semi-Bold"/>
+                <a:ea typeface="Bricolage Grotesque Semi-Bold"/>
+                <a:cs typeface="Bricolage Grotesque Semi-Bold"/>
+                <a:sym typeface="Bricolage Grotesque Semi-Bold"/>
+              </a:rPr>
+              <a:t>Bài</a:t>
+            </a:r>
+            <a:r>
+              <a:rPr lang="en-US" sz="6999" b="1" spc="-209" dirty="0" smtClean="0">
+                <a:solidFill>
+                  <a:srgbClr val="1E293B"/>
+                </a:solidFill>
+                <a:latin typeface="Bricolage Grotesque Semi-Bold"/>
+                <a:ea typeface="Bricolage Grotesque Semi-Bold"/>
+                <a:cs typeface="Bricolage Grotesque Semi-Bold"/>
+                <a:sym typeface="Bricolage Grotesque Semi-Bold"/>
+              </a:rPr>
+              <a:t> News</a:t>
+            </a:r>
+            <a:endParaRPr lang="en-US" sz="6999" b="1" u="none" strike="noStrike" spc="-209" dirty="0">
+              <a:solidFill>
+                <a:srgbClr val="1E293B"/>
+              </a:solidFill>
+              <a:latin typeface="Bricolage Grotesque Semi-Bold"/>
+              <a:ea typeface="Bricolage Grotesque Semi-Bold"/>
+              <a:cs typeface="Bricolage Grotesque Semi-Bold"/>
+              <a:sym typeface="Bricolage Grotesque Semi-Bold"/>
+            </a:endParaRPr>
+          </a:p>
+        </p:txBody>
+      </p:sp>
+      <p:pic>
+        <p:nvPicPr>
+          <p:cNvPr id="4" name="Picture 3"/>
+          <p:cNvPicPr>
+            <a:picLocks noChangeAspect="1"/>
+          </p:cNvPicPr>
+          <p:nvPr/>
+        </p:nvPicPr>
+        <p:blipFill>
+          <a:blip r:embed="rId2"/>
+          <a:stretch>
+            <a:fillRect/>
+          </a:stretch>
+        </p:blipFill>
+        <p:spPr>
+          <a:xfrm>
+            <a:off x="9448800" y="800100"/>
+            <a:ext cx="7963916" cy="8401723"/>
+          </a:xfrm>
+          <a:prstGeom prst="rect">
+            <a:avLst/>
+          </a:prstGeom>
+        </p:spPr>
+      </p:pic>
+      <p:pic>
+        <p:nvPicPr>
+          <p:cNvPr id="5" name="Picture 4"/>
+          <p:cNvPicPr>
+            <a:picLocks noChangeAspect="1"/>
+          </p:cNvPicPr>
+          <p:nvPr/>
+        </p:nvPicPr>
+        <p:blipFill>
+          <a:blip r:embed="rId3"/>
+          <a:stretch>
+            <a:fillRect/>
+          </a:stretch>
+        </p:blipFill>
+        <p:spPr>
+          <a:xfrm>
+            <a:off x="914400" y="5991626"/>
+            <a:ext cx="7366686" cy="3200400"/>
+          </a:xfrm>
+          <a:prstGeom prst="rect">
+            <a:avLst/>
+          </a:prstGeom>
+        </p:spPr>
+      </p:pic>
+    </p:spTree>
+    <p:extLst>
+      <p:ext uri="{BB962C8B-B14F-4D97-AF65-F5344CB8AC3E}">
+        <p14:creationId xmlns:p14="http://schemas.microsoft.com/office/powerpoint/2010/main" val="22399464"/>
+      </p:ext>
+    </p:extLst>
   </p:cSld>
   <p:clrMapOvr>
     <a:masterClrMapping/>

</xml_diff>